<commit_message>
Added a slide on Data Preprocessing
</commit_message>
<xml_diff>
--- a/report/Homework I - Techniques.pptx
+++ b/report/Homework I - Techniques.pptx
@@ -8,15 +8,16 @@
     <p:sldId id="256" r:id="rId2"/>
     <p:sldId id="257" r:id="rId3"/>
     <p:sldId id="258" r:id="rId4"/>
-    <p:sldId id="259" r:id="rId5"/>
-    <p:sldId id="260" r:id="rId6"/>
-    <p:sldId id="261" r:id="rId7"/>
-    <p:sldId id="262" r:id="rId8"/>
-    <p:sldId id="263" r:id="rId9"/>
-    <p:sldId id="264" r:id="rId10"/>
-    <p:sldId id="265" r:id="rId11"/>
-    <p:sldId id="266" r:id="rId12"/>
-    <p:sldId id="267" r:id="rId13"/>
+    <p:sldId id="268" r:id="rId5"/>
+    <p:sldId id="259" r:id="rId6"/>
+    <p:sldId id="260" r:id="rId7"/>
+    <p:sldId id="261" r:id="rId8"/>
+    <p:sldId id="262" r:id="rId9"/>
+    <p:sldId id="263" r:id="rId10"/>
+    <p:sldId id="264" r:id="rId11"/>
+    <p:sldId id="265" r:id="rId12"/>
+    <p:sldId id="266" r:id="rId13"/>
+    <p:sldId id="267" r:id="rId14"/>
   </p:sldIdLst>
   <p:sldSz cx="12192000" cy="6858000"/>
   <p:notesSz cx="6858000" cy="9144000"/>
@@ -395,11 +396,11 @@
           <c:showPercent val="0"/>
           <c:showBubbleSize val="0"/>
         </c:dLbls>
-        <c:axId val="289896056"/>
-        <c:axId val="289896448"/>
+        <c:axId val="281083960"/>
+        <c:axId val="281084352"/>
       </c:scatterChart>
       <c:valAx>
-        <c:axId val="289896056"/>
+        <c:axId val="281083960"/>
         <c:scaling>
           <c:orientation val="minMax"/>
         </c:scaling>
@@ -423,12 +424,12 @@
         <c:majorTickMark val="none"/>
         <c:minorTickMark val="none"/>
         <c:tickLblPos val="nextTo"/>
-        <c:crossAx val="289896448"/>
+        <c:crossAx val="281084352"/>
         <c:crosses val="autoZero"/>
         <c:crossBetween val="midCat"/>
       </c:valAx>
       <c:valAx>
-        <c:axId val="289896448"/>
+        <c:axId val="281084352"/>
         <c:scaling>
           <c:orientation val="minMax"/>
         </c:scaling>
@@ -452,7 +453,7 @@
         <c:majorTickMark val="none"/>
         <c:minorTickMark val="none"/>
         <c:tickLblPos val="nextTo"/>
-        <c:crossAx val="289896056"/>
+        <c:crossAx val="281083960"/>
         <c:crosses val="autoZero"/>
         <c:crossBetween val="midCat"/>
       </c:valAx>
@@ -704,11 +705,11 @@
           <c:showPercent val="0"/>
           <c:showBubbleSize val="0"/>
         </c:dLbls>
-        <c:axId val="289897624"/>
-        <c:axId val="289898016"/>
+        <c:axId val="281085704"/>
+        <c:axId val="281086096"/>
       </c:scatterChart>
       <c:valAx>
-        <c:axId val="289897624"/>
+        <c:axId val="281085704"/>
         <c:scaling>
           <c:orientation val="minMax"/>
         </c:scaling>
@@ -765,12 +766,12 @@
             <a:endParaRPr lang="en-US"/>
           </a:p>
         </c:txPr>
-        <c:crossAx val="289898016"/>
+        <c:crossAx val="281086096"/>
         <c:crosses val="autoZero"/>
         <c:crossBetween val="midCat"/>
       </c:valAx>
       <c:valAx>
-        <c:axId val="289898016"/>
+        <c:axId val="281086096"/>
         <c:scaling>
           <c:orientation val="minMax"/>
         </c:scaling>
@@ -827,7 +828,7 @@
             <a:endParaRPr lang="en-US"/>
           </a:p>
         </c:txPr>
-        <c:crossAx val="289897624"/>
+        <c:crossAx val="281085704"/>
         <c:crosses val="autoZero"/>
         <c:crossBetween val="midCat"/>
       </c:valAx>
@@ -1058,11 +1059,11 @@
           <c:showPercent val="0"/>
           <c:showBubbleSize val="0"/>
         </c:dLbls>
-        <c:axId val="362727240"/>
-        <c:axId val="362727632"/>
+        <c:axId val="281086880"/>
+        <c:axId val="281087272"/>
       </c:scatterChart>
       <c:valAx>
-        <c:axId val="362727240"/>
+        <c:axId val="281086880"/>
         <c:scaling>
           <c:orientation val="minMax"/>
         </c:scaling>
@@ -1105,12 +1106,12 @@
             <a:endParaRPr lang="en-US"/>
           </a:p>
         </c:txPr>
-        <c:crossAx val="362727632"/>
+        <c:crossAx val="281087272"/>
         <c:crosses val="autoZero"/>
         <c:crossBetween val="midCat"/>
       </c:valAx>
       <c:valAx>
-        <c:axId val="362727632"/>
+        <c:axId val="281087272"/>
         <c:scaling>
           <c:orientation val="minMax"/>
         </c:scaling>
@@ -1153,7 +1154,7 @@
             <a:endParaRPr lang="en-US"/>
           </a:p>
         </c:txPr>
-        <c:crossAx val="362727240"/>
+        <c:crossAx val="281086880"/>
         <c:crosses val="autoZero"/>
         <c:crossBetween val="midCat"/>
       </c:valAx>
@@ -3117,7 +3118,7 @@
           <a:p>
             <a:fld id="{881BB3DD-A8C7-42E4-BD13-C5A94ED02CDA}" type="datetimeFigureOut">
               <a:rPr lang="en-GB" smtClean="0"/>
-              <a:t>15/04/2015</a:t>
+              <a:t>17/04/2015</a:t>
             </a:fld>
             <a:endParaRPr lang="en-GB"/>
           </a:p>
@@ -3287,7 +3288,7 @@
           <a:p>
             <a:fld id="{881BB3DD-A8C7-42E4-BD13-C5A94ED02CDA}" type="datetimeFigureOut">
               <a:rPr lang="en-GB" smtClean="0"/>
-              <a:t>15/04/2015</a:t>
+              <a:t>17/04/2015</a:t>
             </a:fld>
             <a:endParaRPr lang="en-GB"/>
           </a:p>
@@ -3467,7 +3468,7 @@
           <a:p>
             <a:fld id="{881BB3DD-A8C7-42E4-BD13-C5A94ED02CDA}" type="datetimeFigureOut">
               <a:rPr lang="en-GB" smtClean="0"/>
-              <a:t>15/04/2015</a:t>
+              <a:t>17/04/2015</a:t>
             </a:fld>
             <a:endParaRPr lang="en-GB"/>
           </a:p>
@@ -3637,7 +3638,7 @@
           <a:p>
             <a:fld id="{881BB3DD-A8C7-42E4-BD13-C5A94ED02CDA}" type="datetimeFigureOut">
               <a:rPr lang="en-GB" smtClean="0"/>
-              <a:t>15/04/2015</a:t>
+              <a:t>17/04/2015</a:t>
             </a:fld>
             <a:endParaRPr lang="en-GB"/>
           </a:p>
@@ -3883,7 +3884,7 @@
           <a:p>
             <a:fld id="{881BB3DD-A8C7-42E4-BD13-C5A94ED02CDA}" type="datetimeFigureOut">
               <a:rPr lang="en-GB" smtClean="0"/>
-              <a:t>15/04/2015</a:t>
+              <a:t>17/04/2015</a:t>
             </a:fld>
             <a:endParaRPr lang="en-GB"/>
           </a:p>
@@ -4115,7 +4116,7 @@
           <a:p>
             <a:fld id="{881BB3DD-A8C7-42E4-BD13-C5A94ED02CDA}" type="datetimeFigureOut">
               <a:rPr lang="en-GB" smtClean="0"/>
-              <a:t>15/04/2015</a:t>
+              <a:t>17/04/2015</a:t>
             </a:fld>
             <a:endParaRPr lang="en-GB"/>
           </a:p>
@@ -4482,7 +4483,7 @@
           <a:p>
             <a:fld id="{881BB3DD-A8C7-42E4-BD13-C5A94ED02CDA}" type="datetimeFigureOut">
               <a:rPr lang="en-GB" smtClean="0"/>
-              <a:t>15/04/2015</a:t>
+              <a:t>17/04/2015</a:t>
             </a:fld>
             <a:endParaRPr lang="en-GB"/>
           </a:p>
@@ -4600,7 +4601,7 @@
           <a:p>
             <a:fld id="{881BB3DD-A8C7-42E4-BD13-C5A94ED02CDA}" type="datetimeFigureOut">
               <a:rPr lang="en-GB" smtClean="0"/>
-              <a:t>15/04/2015</a:t>
+              <a:t>17/04/2015</a:t>
             </a:fld>
             <a:endParaRPr lang="en-GB"/>
           </a:p>
@@ -4695,7 +4696,7 @@
           <a:p>
             <a:fld id="{881BB3DD-A8C7-42E4-BD13-C5A94ED02CDA}" type="datetimeFigureOut">
               <a:rPr lang="en-GB" smtClean="0"/>
-              <a:t>15/04/2015</a:t>
+              <a:t>17/04/2015</a:t>
             </a:fld>
             <a:endParaRPr lang="en-GB"/>
           </a:p>
@@ -4972,7 +4973,7 @@
           <a:p>
             <a:fld id="{881BB3DD-A8C7-42E4-BD13-C5A94ED02CDA}" type="datetimeFigureOut">
               <a:rPr lang="en-GB" smtClean="0"/>
-              <a:t>15/04/2015</a:t>
+              <a:t>17/04/2015</a:t>
             </a:fld>
             <a:endParaRPr lang="en-GB"/>
           </a:p>
@@ -5225,7 +5226,7 @@
           <a:p>
             <a:fld id="{881BB3DD-A8C7-42E4-BD13-C5A94ED02CDA}" type="datetimeFigureOut">
               <a:rPr lang="en-GB" smtClean="0"/>
-              <a:t>15/04/2015</a:t>
+              <a:t>17/04/2015</a:t>
             </a:fld>
             <a:endParaRPr lang="en-GB"/>
           </a:p>
@@ -5438,7 +5439,7 @@
           <a:p>
             <a:fld id="{881BB3DD-A8C7-42E4-BD13-C5A94ED02CDA}" type="datetimeFigureOut">
               <a:rPr lang="en-GB" smtClean="0"/>
-              <a:t>15/04/2015</a:t>
+              <a:t>17/04/2015</a:t>
             </a:fld>
             <a:endParaRPr lang="en-GB"/>
           </a:p>
@@ -5915,6 +5916,147 @@
 </file>
 
 <file path=ppt/slides/slide10.xml><?xml version="1.0" encoding="utf-8"?>
+<p:sld xmlns:a="http://schemas.openxmlformats.org/drawingml/2006/main" xmlns:r="http://schemas.openxmlformats.org/officeDocument/2006/relationships" xmlns:p="http://schemas.openxmlformats.org/presentationml/2006/main">
+  <p:cSld>
+    <p:spTree>
+      <p:nvGrpSpPr>
+        <p:cNvPr id="1" name=""/>
+        <p:cNvGrpSpPr/>
+        <p:nvPr/>
+      </p:nvGrpSpPr>
+      <p:grpSpPr>
+        <a:xfrm>
+          <a:off x="0" y="0"/>
+          <a:ext cx="0" cy="0"/>
+          <a:chOff x="0" y="0"/>
+          <a:chExt cx="0" cy="0"/>
+        </a:xfrm>
+      </p:grpSpPr>
+      <p:sp>
+        <p:nvSpPr>
+          <p:cNvPr id="2" name="Titel 1"/>
+          <p:cNvSpPr>
+            <a:spLocks noGrp="1"/>
+          </p:cNvSpPr>
+          <p:nvPr>
+            <p:ph type="title"/>
+          </p:nvPr>
+        </p:nvSpPr>
+        <p:spPr/>
+        <p:txBody>
+          <a:bodyPr/>
+          <a:lstStyle/>
+          <a:p>
+            <a:r>
+              <a:rPr lang="en-US" dirty="0" smtClean="0"/>
+              <a:t>Ensemble: Bagging &amp; Blending</a:t>
+            </a:r>
+            <a:endParaRPr lang="en-GB" dirty="0"/>
+          </a:p>
+        </p:txBody>
+      </p:sp>
+      <p:sp>
+        <p:nvSpPr>
+          <p:cNvPr id="3" name="Inhaltsplatzhalter 2"/>
+          <p:cNvSpPr>
+            <a:spLocks noGrp="1"/>
+          </p:cNvSpPr>
+          <p:nvPr>
+            <p:ph idx="1"/>
+          </p:nvPr>
+        </p:nvSpPr>
+        <p:spPr/>
+        <p:txBody>
+          <a:bodyPr/>
+          <a:lstStyle/>
+          <a:p>
+            <a:r>
+              <a:rPr lang="en-US" dirty="0" smtClean="0"/>
+              <a:t>Sir Francis Galton took a closer look at the statistics: the individual error is large but the mean…</a:t>
+            </a:r>
+            <a:endParaRPr lang="en-GB" dirty="0"/>
+          </a:p>
+        </p:txBody>
+      </p:sp>
+      <p:pic>
+        <p:nvPicPr>
+          <p:cNvPr id="4" name="Grafik 3"/>
+          <p:cNvPicPr>
+            <a:picLocks noChangeAspect="1"/>
+          </p:cNvPicPr>
+          <p:nvPr/>
+        </p:nvPicPr>
+        <p:blipFill>
+          <a:blip r:embed="rId2"/>
+          <a:stretch>
+            <a:fillRect/>
+          </a:stretch>
+        </p:blipFill>
+        <p:spPr>
+          <a:xfrm>
+            <a:off x="5978272" y="2207474"/>
+            <a:ext cx="6213728" cy="4650526"/>
+          </a:xfrm>
+          <a:prstGeom prst="rect">
+            <a:avLst/>
+          </a:prstGeom>
+        </p:spPr>
+      </p:pic>
+      <p:pic>
+        <p:nvPicPr>
+          <p:cNvPr id="2050" name="Picture 2" descr="http://1.bp.blogspot.com/_iSagC8HPtNA/Szvv1eNOoeI/AAAAAAAAAQ8/InZm8_X-Xwc/s1600/Galton2.jpg"/>
+          <p:cNvPicPr>
+            <a:picLocks noChangeAspect="1" noChangeArrowheads="1"/>
+          </p:cNvPicPr>
+          <p:nvPr/>
+        </p:nvPicPr>
+        <p:blipFill>
+          <a:blip r:embed="rId3">
+            <a:extLst>
+              <a:ext uri="{28A0092B-C50C-407E-A947-70E740481C1C}">
+                <a14:useLocalDpi xmlns:a14="http://schemas.microsoft.com/office/drawing/2010/main" val="0"/>
+              </a:ext>
+            </a:extLst>
+          </a:blip>
+          <a:srcRect/>
+          <a:stretch>
+            <a:fillRect/>
+          </a:stretch>
+        </p:blipFill>
+        <p:spPr bwMode="auto">
+          <a:xfrm>
+            <a:off x="167767" y="3108102"/>
+            <a:ext cx="5631470" cy="3749898"/>
+          </a:xfrm>
+          <a:prstGeom prst="rect">
+            <a:avLst/>
+          </a:prstGeom>
+          <a:noFill/>
+          <a:extLst>
+            <a:ext uri="{909E8E84-426E-40DD-AFC4-6F175D3DCCD1}">
+              <a14:hiddenFill xmlns:a14="http://schemas.microsoft.com/office/drawing/2010/main">
+                <a:solidFill>
+                  <a:srgbClr val="FFFFFF"/>
+                </a:solidFill>
+              </a14:hiddenFill>
+            </a:ext>
+          </a:extLst>
+        </p:spPr>
+      </p:pic>
+    </p:spTree>
+    <p:extLst>
+      <p:ext uri="{BB962C8B-B14F-4D97-AF65-F5344CB8AC3E}">
+        <p14:creationId xmlns:p14="http://schemas.microsoft.com/office/powerpoint/2010/main" val="1856452524"/>
+      </p:ext>
+    </p:extLst>
+  </p:cSld>
+  <p:clrMapOvr>
+    <a:masterClrMapping/>
+  </p:clrMapOvr>
+</p:sld>
+</file>
+
+<file path=ppt/slides/slide11.xml><?xml version="1.0" encoding="utf-8"?>
 <p:sld xmlns:a="http://schemas.openxmlformats.org/drawingml/2006/main" xmlns:r="http://schemas.openxmlformats.org/officeDocument/2006/relationships" xmlns:p="http://schemas.openxmlformats.org/presentationml/2006/main">
   <p:cSld>
     <p:spTree>
@@ -9612,7 +9754,7 @@
 </p:sld>
 </file>
 
-<file path=ppt/slides/slide11.xml><?xml version="1.0" encoding="utf-8"?>
+<file path=ppt/slides/slide12.xml><?xml version="1.0" encoding="utf-8"?>
 <p:sld xmlns:a="http://schemas.openxmlformats.org/drawingml/2006/main" xmlns:r="http://schemas.openxmlformats.org/officeDocument/2006/relationships" xmlns:p="http://schemas.openxmlformats.org/presentationml/2006/main">
   <p:cSld>
     <p:spTree>
@@ -9700,7 +9842,7 @@
 </p:sld>
 </file>
 
-<file path=ppt/slides/slide12.xml><?xml version="1.0" encoding="utf-8"?>
+<file path=ppt/slides/slide13.xml><?xml version="1.0" encoding="utf-8"?>
 <p:sld xmlns:a="http://schemas.openxmlformats.org/drawingml/2006/main" xmlns:r="http://schemas.openxmlformats.org/officeDocument/2006/relationships" xmlns:p="http://schemas.openxmlformats.org/presentationml/2006/main">
   <p:cSld>
     <p:spTree>
@@ -10104,6 +10246,534 @@
 </file>
 
 <file path=ppt/slides/slide4.xml><?xml version="1.0" encoding="utf-8"?>
+<p:sld xmlns:a="http://schemas.openxmlformats.org/drawingml/2006/main" xmlns:r="http://schemas.openxmlformats.org/officeDocument/2006/relationships" xmlns:p="http://schemas.openxmlformats.org/presentationml/2006/main">
+  <p:cSld>
+    <p:spTree>
+      <p:nvGrpSpPr>
+        <p:cNvPr id="1" name=""/>
+        <p:cNvGrpSpPr/>
+        <p:nvPr/>
+      </p:nvGrpSpPr>
+      <p:grpSpPr>
+        <a:xfrm>
+          <a:off x="0" y="0"/>
+          <a:ext cx="0" cy="0"/>
+          <a:chOff x="0" y="0"/>
+          <a:chExt cx="0" cy="0"/>
+        </a:xfrm>
+      </p:grpSpPr>
+      <p:sp>
+        <p:nvSpPr>
+          <p:cNvPr id="2" name="Titel 1"/>
+          <p:cNvSpPr>
+            <a:spLocks noGrp="1"/>
+          </p:cNvSpPr>
+          <p:nvPr>
+            <p:ph type="title"/>
+          </p:nvPr>
+        </p:nvSpPr>
+        <p:spPr/>
+        <p:txBody>
+          <a:bodyPr/>
+          <a:lstStyle/>
+          <a:p>
+            <a:r>
+              <a:rPr lang="en-US" dirty="0" smtClean="0"/>
+              <a:t>Data Preprocessing</a:t>
+            </a:r>
+            <a:endParaRPr lang="en-GB" dirty="0"/>
+          </a:p>
+        </p:txBody>
+      </p:sp>
+      <mc:AlternateContent xmlns:mc="http://schemas.openxmlformats.org/markup-compatibility/2006">
+        <mc:Choice xmlns:a14="http://schemas.microsoft.com/office/drawing/2010/main" Requires="a14">
+          <p:sp>
+            <p:nvSpPr>
+              <p:cNvPr id="3" name="Inhaltsplatzhalter 2"/>
+              <p:cNvSpPr>
+                <a:spLocks noGrp="1"/>
+              </p:cNvSpPr>
+              <p:nvPr>
+                <p:ph idx="1"/>
+              </p:nvPr>
+            </p:nvSpPr>
+            <p:spPr/>
+            <p:txBody>
+              <a:bodyPr/>
+              <a:lstStyle/>
+              <a:p>
+                <a:r>
+                  <a:rPr lang="en-US" dirty="0" smtClean="0"/>
+                  <a:t>Backpropagation requires the derivative of error </a:t>
+                </a:r>
+                <a14:m>
+                  <m:oMath xmlns:m="http://schemas.openxmlformats.org/officeDocument/2006/math">
+                    <m:r>
+                      <a:rPr lang="en-US" b="0" i="1" smtClean="0">
+                        <a:latin typeface="Cambria Math" panose="02040503050406030204" pitchFamily="18" charset="0"/>
+                      </a:rPr>
+                      <m:t>𝐸</m:t>
+                    </m:r>
+                  </m:oMath>
+                </a14:m>
+                <a:r>
+                  <a:rPr lang="en-GB" dirty="0" smtClean="0"/>
+                  <a:t> with respect to the weights </a:t>
+                </a:r>
+                <a14:m>
+                  <m:oMath xmlns:m="http://schemas.openxmlformats.org/officeDocument/2006/math">
+                    <m:sSub>
+                      <m:sSubPr>
+                        <m:ctrlPr>
+                          <a:rPr lang="en-US" b="0" i="1" smtClean="0">
+                            <a:latin typeface="Cambria Math" panose="02040503050406030204" pitchFamily="18" charset="0"/>
+                          </a:rPr>
+                        </m:ctrlPr>
+                      </m:sSubPr>
+                      <m:e>
+                        <m:r>
+                          <a:rPr lang="en-US" b="0" i="1" smtClean="0">
+                            <a:latin typeface="Cambria Math" panose="02040503050406030204" pitchFamily="18" charset="0"/>
+                          </a:rPr>
+                          <m:t>𝑤</m:t>
+                        </m:r>
+                      </m:e>
+                      <m:sub>
+                        <m:r>
+                          <a:rPr lang="en-US" b="0" i="1" smtClean="0">
+                            <a:latin typeface="Cambria Math" panose="02040503050406030204" pitchFamily="18" charset="0"/>
+                          </a:rPr>
+                          <m:t>𝑖𝑗</m:t>
+                        </m:r>
+                      </m:sub>
+                    </m:sSub>
+                  </m:oMath>
+                </a14:m>
+                <a:r>
+                  <a:rPr lang="en-GB" dirty="0" smtClean="0"/>
+                  <a:t>: </a:t>
+                </a:r>
+                <a14:m>
+                  <m:oMath xmlns:m="http://schemas.openxmlformats.org/officeDocument/2006/math">
+                    <m:r>
+                      <m:rPr>
+                        <m:sty m:val="p"/>
+                      </m:rPr>
+                      <a:rPr lang="en-US" b="0" i="0" smtClean="0">
+                        <a:latin typeface="Cambria Math" panose="02040503050406030204" pitchFamily="18" charset="0"/>
+                      </a:rPr>
+                      <m:t>Δ</m:t>
+                    </m:r>
+                    <m:sSub>
+                      <m:sSubPr>
+                        <m:ctrlPr>
+                          <a:rPr lang="en-US" b="0" i="1" smtClean="0">
+                            <a:latin typeface="Cambria Math" panose="02040503050406030204" pitchFamily="18" charset="0"/>
+                          </a:rPr>
+                        </m:ctrlPr>
+                      </m:sSubPr>
+                      <m:e>
+                        <m:r>
+                          <a:rPr lang="en-US" b="0" i="1" smtClean="0">
+                            <a:latin typeface="Cambria Math" panose="02040503050406030204" pitchFamily="18" charset="0"/>
+                          </a:rPr>
+                          <m:t>𝑤</m:t>
+                        </m:r>
+                      </m:e>
+                      <m:sub>
+                        <m:r>
+                          <a:rPr lang="en-US" b="0" i="1" smtClean="0">
+                            <a:latin typeface="Cambria Math" panose="02040503050406030204" pitchFamily="18" charset="0"/>
+                          </a:rPr>
+                          <m:t>𝑖𝑗</m:t>
+                        </m:r>
+                      </m:sub>
+                    </m:sSub>
+                    <m:r>
+                      <a:rPr lang="en-US" b="0" i="1" smtClean="0">
+                        <a:latin typeface="Cambria Math" panose="02040503050406030204" pitchFamily="18" charset="0"/>
+                      </a:rPr>
+                      <m:t>=−</m:t>
+                    </m:r>
+                    <m:r>
+                      <a:rPr lang="en-US" b="0" i="1" smtClean="0">
+                        <a:latin typeface="Cambria Math" panose="02040503050406030204" pitchFamily="18" charset="0"/>
+                      </a:rPr>
+                      <m:t>𝜂</m:t>
+                    </m:r>
+                    <m:f>
+                      <m:fPr>
+                        <m:ctrlPr>
+                          <a:rPr lang="en-US" b="0" i="1" smtClean="0">
+                            <a:latin typeface="Cambria Math" panose="02040503050406030204" pitchFamily="18" charset="0"/>
+                          </a:rPr>
+                        </m:ctrlPr>
+                      </m:fPr>
+                      <m:num>
+                        <m:r>
+                          <a:rPr lang="en-US" b="0" i="1" smtClean="0">
+                            <a:latin typeface="Cambria Math" panose="02040503050406030204" pitchFamily="18" charset="0"/>
+                          </a:rPr>
+                          <m:t>𝜕</m:t>
+                        </m:r>
+                        <m:r>
+                          <a:rPr lang="en-US" b="0" i="1" smtClean="0">
+                            <a:latin typeface="Cambria Math" panose="02040503050406030204" pitchFamily="18" charset="0"/>
+                          </a:rPr>
+                          <m:t>𝐸</m:t>
+                        </m:r>
+                      </m:num>
+                      <m:den>
+                        <m:r>
+                          <a:rPr lang="en-US" b="0" i="1" smtClean="0">
+                            <a:latin typeface="Cambria Math" panose="02040503050406030204" pitchFamily="18" charset="0"/>
+                          </a:rPr>
+                          <m:t>𝜕</m:t>
+                        </m:r>
+                        <m:sSub>
+                          <m:sSubPr>
+                            <m:ctrlPr>
+                              <a:rPr lang="en-US" b="0" i="1" smtClean="0">
+                                <a:latin typeface="Cambria Math" panose="02040503050406030204" pitchFamily="18" charset="0"/>
+                              </a:rPr>
+                            </m:ctrlPr>
+                          </m:sSubPr>
+                          <m:e>
+                            <m:r>
+                              <a:rPr lang="en-US" b="0" i="1" smtClean="0">
+                                <a:latin typeface="Cambria Math" panose="02040503050406030204" pitchFamily="18" charset="0"/>
+                              </a:rPr>
+                              <m:t>𝑤</m:t>
+                            </m:r>
+                          </m:e>
+                          <m:sub>
+                            <m:r>
+                              <a:rPr lang="en-US" b="0" i="1" smtClean="0">
+                                <a:latin typeface="Cambria Math" panose="02040503050406030204" pitchFamily="18" charset="0"/>
+                              </a:rPr>
+                              <m:t>𝑖𝑗</m:t>
+                            </m:r>
+                          </m:sub>
+                        </m:sSub>
+                      </m:den>
+                    </m:f>
+                  </m:oMath>
+                </a14:m>
+                <a:endParaRPr lang="en-GB" dirty="0" smtClean="0"/>
+              </a:p>
+              <a:p>
+                <a:endParaRPr lang="en-US" i="1" dirty="0" smtClean="0">
+                  <a:latin typeface="Cambria Math" panose="02040503050406030204" pitchFamily="18" charset="0"/>
+                </a:endParaRPr>
+              </a:p>
+              <a:p>
+                <a14:m>
+                  <m:oMath xmlns:m="http://schemas.openxmlformats.org/officeDocument/2006/math">
+                    <m:f>
+                      <m:fPr>
+                        <m:ctrlPr>
+                          <a:rPr lang="en-US" i="1">
+                            <a:latin typeface="Cambria Math" panose="02040503050406030204" pitchFamily="18" charset="0"/>
+                          </a:rPr>
+                        </m:ctrlPr>
+                      </m:fPr>
+                      <m:num>
+                        <m:r>
+                          <a:rPr lang="en-US" i="1">
+                            <a:latin typeface="Cambria Math" panose="02040503050406030204" pitchFamily="18" charset="0"/>
+                          </a:rPr>
+                          <m:t>𝜕</m:t>
+                        </m:r>
+                        <m:r>
+                          <a:rPr lang="en-US" i="1">
+                            <a:latin typeface="Cambria Math" panose="02040503050406030204" pitchFamily="18" charset="0"/>
+                          </a:rPr>
+                          <m:t>𝐸</m:t>
+                        </m:r>
+                      </m:num>
+                      <m:den>
+                        <m:r>
+                          <a:rPr lang="en-US" i="1">
+                            <a:latin typeface="Cambria Math" panose="02040503050406030204" pitchFamily="18" charset="0"/>
+                          </a:rPr>
+                          <m:t>𝜕</m:t>
+                        </m:r>
+                        <m:sSub>
+                          <m:sSubPr>
+                            <m:ctrlPr>
+                              <a:rPr lang="en-US" i="1">
+                                <a:latin typeface="Cambria Math" panose="02040503050406030204" pitchFamily="18" charset="0"/>
+                              </a:rPr>
+                            </m:ctrlPr>
+                          </m:sSubPr>
+                          <m:e>
+                            <m:r>
+                              <a:rPr lang="en-US" i="1">
+                                <a:latin typeface="Cambria Math" panose="02040503050406030204" pitchFamily="18" charset="0"/>
+                              </a:rPr>
+                              <m:t>𝑤</m:t>
+                            </m:r>
+                          </m:e>
+                          <m:sub>
+                            <m:r>
+                              <a:rPr lang="en-US" i="1">
+                                <a:latin typeface="Cambria Math" panose="02040503050406030204" pitchFamily="18" charset="0"/>
+                              </a:rPr>
+                              <m:t>𝑖𝑗</m:t>
+                            </m:r>
+                          </m:sub>
+                        </m:sSub>
+                      </m:den>
+                    </m:f>
+                    <m:r>
+                      <a:rPr lang="en-US" b="0" i="1" smtClean="0">
+                        <a:latin typeface="Cambria Math" panose="02040503050406030204" pitchFamily="18" charset="0"/>
+                      </a:rPr>
+                      <m:t>=</m:t>
+                    </m:r>
+                    <m:sSub>
+                      <m:sSubPr>
+                        <m:ctrlPr>
+                          <a:rPr lang="en-US" b="0" i="1" smtClean="0">
+                            <a:latin typeface="Cambria Math" panose="02040503050406030204" pitchFamily="18" charset="0"/>
+                          </a:rPr>
+                        </m:ctrlPr>
+                      </m:sSubPr>
+                      <m:e>
+                        <m:r>
+                          <a:rPr lang="en-US" b="0" i="1" smtClean="0">
+                            <a:latin typeface="Cambria Math" panose="02040503050406030204" pitchFamily="18" charset="0"/>
+                          </a:rPr>
+                          <m:t>𝛿</m:t>
+                        </m:r>
+                      </m:e>
+                      <m:sub>
+                        <m:r>
+                          <a:rPr lang="en-US" b="0" i="1" smtClean="0">
+                            <a:latin typeface="Cambria Math" panose="02040503050406030204" pitchFamily="18" charset="0"/>
+                          </a:rPr>
+                          <m:t>𝑖</m:t>
+                        </m:r>
+                      </m:sub>
+                    </m:sSub>
+                    <m:sSub>
+                      <m:sSubPr>
+                        <m:ctrlPr>
+                          <a:rPr lang="en-US" b="0" i="1" smtClean="0">
+                            <a:latin typeface="Cambria Math" panose="02040503050406030204" pitchFamily="18" charset="0"/>
+                          </a:rPr>
+                        </m:ctrlPr>
+                      </m:sSubPr>
+                      <m:e>
+                        <m:r>
+                          <a:rPr lang="en-US" b="0" i="1" smtClean="0">
+                            <a:latin typeface="Cambria Math" panose="02040503050406030204" pitchFamily="18" charset="0"/>
+                          </a:rPr>
+                          <m:t>𝑥</m:t>
+                        </m:r>
+                      </m:e>
+                      <m:sub>
+                        <m:r>
+                          <a:rPr lang="en-US" b="0" i="1" smtClean="0">
+                            <a:latin typeface="Cambria Math" panose="02040503050406030204" pitchFamily="18" charset="0"/>
+                          </a:rPr>
+                          <m:t>𝑗</m:t>
+                        </m:r>
+                      </m:sub>
+                    </m:sSub>
+                    <m:r>
+                      <a:rPr lang="en-US" b="0" i="1" smtClean="0">
+                        <a:latin typeface="Cambria Math" panose="02040503050406030204" pitchFamily="18" charset="0"/>
+                      </a:rPr>
+                      <m:t>⇒</m:t>
+                    </m:r>
+                    <m:r>
+                      <m:rPr>
+                        <m:sty m:val="p"/>
+                      </m:rPr>
+                      <a:rPr lang="en-US" b="0" i="0" smtClean="0">
+                        <a:latin typeface="Cambria Math" panose="02040503050406030204" pitchFamily="18" charset="0"/>
+                      </a:rPr>
+                      <m:t>Δ</m:t>
+                    </m:r>
+                    <m:sSub>
+                      <m:sSubPr>
+                        <m:ctrlPr>
+                          <a:rPr lang="en-US" b="0" i="1" smtClean="0">
+                            <a:latin typeface="Cambria Math" panose="02040503050406030204" pitchFamily="18" charset="0"/>
+                          </a:rPr>
+                        </m:ctrlPr>
+                      </m:sSubPr>
+                      <m:e>
+                        <m:r>
+                          <a:rPr lang="en-US" b="0" i="1" smtClean="0">
+                            <a:latin typeface="Cambria Math" panose="02040503050406030204" pitchFamily="18" charset="0"/>
+                          </a:rPr>
+                          <m:t>𝑤</m:t>
+                        </m:r>
+                      </m:e>
+                      <m:sub>
+                        <m:r>
+                          <a:rPr lang="en-US" b="0" i="1" smtClean="0">
+                            <a:latin typeface="Cambria Math" panose="02040503050406030204" pitchFamily="18" charset="0"/>
+                          </a:rPr>
+                          <m:t>𝑖𝑗</m:t>
+                        </m:r>
+                      </m:sub>
+                    </m:sSub>
+                    <m:r>
+                      <a:rPr lang="en-US" b="0" i="1" smtClean="0">
+                        <a:latin typeface="Cambria Math" panose="02040503050406030204" pitchFamily="18" charset="0"/>
+                      </a:rPr>
+                      <m:t>~−</m:t>
+                    </m:r>
+                    <m:sSub>
+                      <m:sSubPr>
+                        <m:ctrlPr>
+                          <a:rPr lang="en-US" b="0" i="1" smtClean="0">
+                            <a:latin typeface="Cambria Math" panose="02040503050406030204" pitchFamily="18" charset="0"/>
+                          </a:rPr>
+                        </m:ctrlPr>
+                      </m:sSubPr>
+                      <m:e>
+                        <m:r>
+                          <a:rPr lang="en-US" b="0" i="1" smtClean="0">
+                            <a:latin typeface="Cambria Math" panose="02040503050406030204" pitchFamily="18" charset="0"/>
+                          </a:rPr>
+                          <m:t>𝑥</m:t>
+                        </m:r>
+                      </m:e>
+                      <m:sub>
+                        <m:r>
+                          <a:rPr lang="en-US" b="0" i="1" smtClean="0">
+                            <a:latin typeface="Cambria Math" panose="02040503050406030204" pitchFamily="18" charset="0"/>
+                          </a:rPr>
+                          <m:t>𝑗</m:t>
+                        </m:r>
+                      </m:sub>
+                    </m:sSub>
+                  </m:oMath>
+                </a14:m>
+                <a:endParaRPr lang="en-GB" dirty="0" smtClean="0"/>
+              </a:p>
+              <a:p>
+                <a:endParaRPr lang="en-US" dirty="0" smtClean="0"/>
+              </a:p>
+              <a:p>
+                <a:r>
+                  <a:rPr lang="en-US" i="1" dirty="0" smtClean="0"/>
+                  <a:t>Variance</a:t>
+                </a:r>
+                <a:r>
+                  <a:rPr lang="en-US" dirty="0" smtClean="0"/>
+                  <a:t> and </a:t>
+                </a:r>
+                <a:r>
+                  <a:rPr lang="en-US" i="1" dirty="0" smtClean="0"/>
+                  <a:t>Mean</a:t>
+                </a:r>
+                <a:r>
+                  <a:rPr lang="en-US" dirty="0" smtClean="0"/>
+                  <a:t> of </a:t>
+                </a:r>
+                <a14:m>
+                  <m:oMath xmlns:m="http://schemas.openxmlformats.org/officeDocument/2006/math">
+                    <m:sSub>
+                      <m:sSubPr>
+                        <m:ctrlPr>
+                          <a:rPr lang="en-US" b="0" i="1" smtClean="0">
+                            <a:latin typeface="Cambria Math" panose="02040503050406030204" pitchFamily="18" charset="0"/>
+                          </a:rPr>
+                        </m:ctrlPr>
+                      </m:sSubPr>
+                      <m:e>
+                        <m:r>
+                          <a:rPr lang="en-US" b="0" i="1" smtClean="0">
+                            <a:latin typeface="Cambria Math" panose="02040503050406030204" pitchFamily="18" charset="0"/>
+                          </a:rPr>
+                          <m:t>𝑥</m:t>
+                        </m:r>
+                      </m:e>
+                      <m:sub>
+                        <m:r>
+                          <a:rPr lang="en-US" b="0" i="1" smtClean="0">
+                            <a:latin typeface="Cambria Math" panose="02040503050406030204" pitchFamily="18" charset="0"/>
+                          </a:rPr>
+                          <m:t>𝑗</m:t>
+                        </m:r>
+                      </m:sub>
+                    </m:sSub>
+                  </m:oMath>
+                </a14:m>
+                <a:r>
+                  <a:rPr lang="en-GB" dirty="0" smtClean="0"/>
+                  <a:t> are likely </a:t>
+                </a:r>
+                <a:r>
+                  <a:rPr lang="en-GB" smtClean="0"/>
+                  <a:t>to unexpectedly </a:t>
+                </a:r>
+                <a:r>
+                  <a:rPr lang="en-GB" dirty="0" smtClean="0"/>
+                  <a:t>influence the gradient and thereby the </a:t>
+                </a:r>
+                <a:r>
+                  <a:rPr lang="en-GB" smtClean="0"/>
+                  <a:t>learning process!</a:t>
+                </a:r>
+                <a:endParaRPr lang="en-GB" dirty="0"/>
+              </a:p>
+            </p:txBody>
+          </p:sp>
+        </mc:Choice>
+        <mc:Fallback>
+          <p:sp>
+            <p:nvSpPr>
+              <p:cNvPr id="3" name="Inhaltsplatzhalter 2"/>
+              <p:cNvSpPr>
+                <a:spLocks noGrp="1" noRot="1" noChangeAspect="1" noMove="1" noResize="1" noEditPoints="1" noAdjustHandles="1" noChangeArrowheads="1" noChangeShapeType="1" noTextEdit="1"/>
+              </p:cNvSpPr>
+              <p:nvPr>
+                <p:ph idx="1"/>
+              </p:nvPr>
+            </p:nvSpPr>
+            <p:spPr>
+              <a:blipFill rotWithShape="0">
+                <a:blip r:embed="rId2"/>
+                <a:stretch>
+                  <a:fillRect l="-1043" t="-2241" r="-1797"/>
+                </a:stretch>
+              </a:blipFill>
+            </p:spPr>
+            <p:txBody>
+              <a:bodyPr/>
+              <a:lstStyle/>
+              <a:p>
+                <a:r>
+                  <a:rPr lang="en-GB">
+                    <a:noFill/>
+                  </a:rPr>
+                  <a:t> </a:t>
+                </a:r>
+              </a:p>
+            </p:txBody>
+          </p:sp>
+        </mc:Fallback>
+      </mc:AlternateContent>
+    </p:spTree>
+    <p:extLst>
+      <p:ext uri="{BB962C8B-B14F-4D97-AF65-F5344CB8AC3E}">
+        <p14:creationId xmlns:p14="http://schemas.microsoft.com/office/powerpoint/2010/main" val="578077310"/>
+      </p:ext>
+    </p:extLst>
+  </p:cSld>
+  <p:clrMapOvr>
+    <a:masterClrMapping/>
+  </p:clrMapOvr>
+</p:sld>
+</file>
+
+<file path=ppt/slides/slide5.xml><?xml version="1.0" encoding="utf-8"?>
 <p:sld xmlns:a="http://schemas.openxmlformats.org/drawingml/2006/main" xmlns:r="http://schemas.openxmlformats.org/officeDocument/2006/relationships" xmlns:p="http://schemas.openxmlformats.org/presentationml/2006/main">
   <p:cSld>
     <p:spTree>
@@ -10493,7 +11163,7 @@
 </p:sld>
 </file>
 
-<file path=ppt/slides/slide5.xml><?xml version="1.0" encoding="utf-8"?>
+<file path=ppt/slides/slide6.xml><?xml version="1.0" encoding="utf-8"?>
 <p:sld xmlns:a="http://schemas.openxmlformats.org/drawingml/2006/main" xmlns:r="http://schemas.openxmlformats.org/officeDocument/2006/relationships" xmlns:p="http://schemas.openxmlformats.org/presentationml/2006/main">
   <p:cSld>
     <p:spTree>
@@ -10864,7 +11534,7 @@
 </p:sld>
 </file>
 
-<file path=ppt/slides/slide6.xml><?xml version="1.0" encoding="utf-8"?>
+<file path=ppt/slides/slide7.xml><?xml version="1.0" encoding="utf-8"?>
 <p:sld xmlns:a="http://schemas.openxmlformats.org/drawingml/2006/main" xmlns:r="http://schemas.openxmlformats.org/officeDocument/2006/relationships" xmlns:p="http://schemas.openxmlformats.org/presentationml/2006/main">
   <p:cSld>
     <p:spTree>
@@ -11545,7 +12215,7 @@
 </p:sld>
 </file>
 
-<file path=ppt/slides/slide7.xml><?xml version="1.0" encoding="utf-8"?>
+<file path=ppt/slides/slide8.xml><?xml version="1.0" encoding="utf-8"?>
 <p:sld xmlns:a="http://schemas.openxmlformats.org/drawingml/2006/main" xmlns:r="http://schemas.openxmlformats.org/officeDocument/2006/relationships" xmlns:p="http://schemas.openxmlformats.org/presentationml/2006/main">
   <p:cSld>
     <p:spTree>
@@ -12311,7 +12981,7 @@
 </p:sld>
 </file>
 
-<file path=ppt/slides/slide8.xml><?xml version="1.0" encoding="utf-8"?>
+<file path=ppt/slides/slide9.xml><?xml version="1.0" encoding="utf-8"?>
 <p:sld xmlns:a="http://schemas.openxmlformats.org/drawingml/2006/main" xmlns:r="http://schemas.openxmlformats.org/officeDocument/2006/relationships" xmlns:p="http://schemas.openxmlformats.org/presentationml/2006/main">
   <p:cSld>
     <p:spTree>
@@ -12435,147 +13105,6 @@
     <p:extLst>
       <p:ext uri="{BB962C8B-B14F-4D97-AF65-F5344CB8AC3E}">
         <p14:creationId xmlns:p14="http://schemas.microsoft.com/office/powerpoint/2010/main" val="3508943676"/>
-      </p:ext>
-    </p:extLst>
-  </p:cSld>
-  <p:clrMapOvr>
-    <a:masterClrMapping/>
-  </p:clrMapOvr>
-</p:sld>
-</file>
-
-<file path=ppt/slides/slide9.xml><?xml version="1.0" encoding="utf-8"?>
-<p:sld xmlns:a="http://schemas.openxmlformats.org/drawingml/2006/main" xmlns:r="http://schemas.openxmlformats.org/officeDocument/2006/relationships" xmlns:p="http://schemas.openxmlformats.org/presentationml/2006/main">
-  <p:cSld>
-    <p:spTree>
-      <p:nvGrpSpPr>
-        <p:cNvPr id="1" name=""/>
-        <p:cNvGrpSpPr/>
-        <p:nvPr/>
-      </p:nvGrpSpPr>
-      <p:grpSpPr>
-        <a:xfrm>
-          <a:off x="0" y="0"/>
-          <a:ext cx="0" cy="0"/>
-          <a:chOff x="0" y="0"/>
-          <a:chExt cx="0" cy="0"/>
-        </a:xfrm>
-      </p:grpSpPr>
-      <p:sp>
-        <p:nvSpPr>
-          <p:cNvPr id="2" name="Titel 1"/>
-          <p:cNvSpPr>
-            <a:spLocks noGrp="1"/>
-          </p:cNvSpPr>
-          <p:nvPr>
-            <p:ph type="title"/>
-          </p:nvPr>
-        </p:nvSpPr>
-        <p:spPr/>
-        <p:txBody>
-          <a:bodyPr/>
-          <a:lstStyle/>
-          <a:p>
-            <a:r>
-              <a:rPr lang="en-US" dirty="0" smtClean="0"/>
-              <a:t>Ensemble: Bagging &amp; Blending</a:t>
-            </a:r>
-            <a:endParaRPr lang="en-GB" dirty="0"/>
-          </a:p>
-        </p:txBody>
-      </p:sp>
-      <p:sp>
-        <p:nvSpPr>
-          <p:cNvPr id="3" name="Inhaltsplatzhalter 2"/>
-          <p:cNvSpPr>
-            <a:spLocks noGrp="1"/>
-          </p:cNvSpPr>
-          <p:nvPr>
-            <p:ph idx="1"/>
-          </p:nvPr>
-        </p:nvSpPr>
-        <p:spPr/>
-        <p:txBody>
-          <a:bodyPr/>
-          <a:lstStyle/>
-          <a:p>
-            <a:r>
-              <a:rPr lang="en-US" dirty="0" smtClean="0"/>
-              <a:t>Sir Francis Galton took a closer look at the statistics: the individual error is large but the mean…</a:t>
-            </a:r>
-            <a:endParaRPr lang="en-GB" dirty="0"/>
-          </a:p>
-        </p:txBody>
-      </p:sp>
-      <p:pic>
-        <p:nvPicPr>
-          <p:cNvPr id="4" name="Grafik 3"/>
-          <p:cNvPicPr>
-            <a:picLocks noChangeAspect="1"/>
-          </p:cNvPicPr>
-          <p:nvPr/>
-        </p:nvPicPr>
-        <p:blipFill>
-          <a:blip r:embed="rId2"/>
-          <a:stretch>
-            <a:fillRect/>
-          </a:stretch>
-        </p:blipFill>
-        <p:spPr>
-          <a:xfrm>
-            <a:off x="5978272" y="2207474"/>
-            <a:ext cx="6213728" cy="4650526"/>
-          </a:xfrm>
-          <a:prstGeom prst="rect">
-            <a:avLst/>
-          </a:prstGeom>
-        </p:spPr>
-      </p:pic>
-      <p:pic>
-        <p:nvPicPr>
-          <p:cNvPr id="2050" name="Picture 2" descr="http://1.bp.blogspot.com/_iSagC8HPtNA/Szvv1eNOoeI/AAAAAAAAAQ8/InZm8_X-Xwc/s1600/Galton2.jpg"/>
-          <p:cNvPicPr>
-            <a:picLocks noChangeAspect="1" noChangeArrowheads="1"/>
-          </p:cNvPicPr>
-          <p:nvPr/>
-        </p:nvPicPr>
-        <p:blipFill>
-          <a:blip r:embed="rId3">
-            <a:extLst>
-              <a:ext uri="{28A0092B-C50C-407E-A947-70E740481C1C}">
-                <a14:useLocalDpi xmlns:a14="http://schemas.microsoft.com/office/drawing/2010/main" val="0"/>
-              </a:ext>
-            </a:extLst>
-          </a:blip>
-          <a:srcRect/>
-          <a:stretch>
-            <a:fillRect/>
-          </a:stretch>
-        </p:blipFill>
-        <p:spPr bwMode="auto">
-          <a:xfrm>
-            <a:off x="167767" y="3108102"/>
-            <a:ext cx="5631470" cy="3749898"/>
-          </a:xfrm>
-          <a:prstGeom prst="rect">
-            <a:avLst/>
-          </a:prstGeom>
-          <a:noFill/>
-          <a:extLst>
-            <a:ext uri="{909E8E84-426E-40DD-AFC4-6F175D3DCCD1}">
-              <a14:hiddenFill xmlns:a14="http://schemas.microsoft.com/office/drawing/2010/main">
-                <a:solidFill>
-                  <a:srgbClr val="FFFFFF"/>
-                </a:solidFill>
-              </a14:hiddenFill>
-            </a:ext>
-          </a:extLst>
-        </p:spPr>
-      </p:pic>
-    </p:spTree>
-    <p:extLst>
-      <p:ext uri="{BB962C8B-B14F-4D97-AF65-F5344CB8AC3E}">
-        <p14:creationId xmlns:p14="http://schemas.microsoft.com/office/powerpoint/2010/main" val="1856452524"/>
       </p:ext>
     </p:extLst>
   </p:cSld>

</xml_diff>